<commit_message>
Continuação do Report 4 e pitch
</commit_message>
<xml_diff>
--- a/Documentos/ModeloApresentaçãoFacens_Sugestão.pptx
+++ b/Documentos/ModeloApresentaçãoFacens_Sugestão.pptx
@@ -2723,10 +2723,24 @@
             <p:ph idx="1"/>
           </p:nvPr>
         </p:nvSpPr>
-        <p:spPr/>
-        <p:txBody>
-          <a:bodyPr/>
+        <p:spPr>
+          <a:xfrm>
+            <a:off x="457200" y="1261110"/>
+            <a:ext cx="8229600" cy="3055620"/>
+          </a:xfrm>
+        </p:spPr>
+        <p:txBody>
+          <a:bodyPr>
+            <a:normAutofit/>
+          </a:bodyPr>
           <a:lstStyle/>
+          <a:p>
+            <a:pPr marL="457200" lvl="1" indent="0">
+              <a:buFont typeface="Arial" panose="020B0604020202020204" pitchFamily="34" charset="0"/>
+              <a:buNone/>
+            </a:pPr>
+            <a:endParaRPr lang="pt-BR" dirty="0"/>
+          </a:p>
           <a:p>
             <a:pPr lvl="1">
               <a:buFont typeface="Arial" panose="020B0604020202020204" pitchFamily="34" charset="0"/>
@@ -2734,7 +2748,7 @@
             </a:pPr>
             <a:r>
               <a:rPr lang="pt-BR" dirty="0"/>
-              <a:t>Ferramentas</a:t>
+              <a:t>Visual Studio Code versão 1.45.1</a:t>
             </a:r>
             <a:endParaRPr lang="pt-BR" dirty="0"/>
           </a:p>
@@ -2745,7 +2759,7 @@
             </a:pPr>
             <a:r>
               <a:rPr lang="pt-BR" dirty="0"/>
-              <a:t>Softwares</a:t>
+              <a:t>Anaconda versão 1.9.12</a:t>
             </a:r>
             <a:endParaRPr lang="pt-BR" dirty="0"/>
           </a:p>
@@ -2756,74 +2770,30 @@
             </a:pPr>
             <a:r>
               <a:rPr lang="pt-BR" dirty="0"/>
-              <a:t>Recursos</a:t>
+              <a:t>Python versão 3.7</a:t>
             </a:r>
             <a:endParaRPr lang="pt-BR" dirty="0"/>
+          </a:p>
+          <a:p>
+            <a:pPr lvl="2">
+              <a:buFont typeface="Arial" panose="020B0604020202020204" pitchFamily="34" charset="0"/>
+              <a:buChar char="•"/>
+            </a:pPr>
+            <a:r>
+              <a:rPr lang="pt-BR" dirty="0"/>
+              <a:t>Bibliotecas BeautifulSoup4, Pandas, Numpy, Tensorflow</a:t>
+            </a:r>
+            <a:endParaRPr lang="pt-BR" sz="2400" dirty="0"/>
           </a:p>
           <a:p>
             <a:pPr lvl="1">
               <a:buFont typeface="Arial" panose="020B0604020202020204" pitchFamily="34" charset="0"/>
               <a:buChar char="•"/>
             </a:pPr>
-            <a:r>
-              <a:rPr lang="pt-BR" dirty="0"/>
-              <a:t>Linguagens</a:t>
-            </a:r>
-            <a:endParaRPr lang="pt-BR" dirty="0"/>
-          </a:p>
-          <a:p>
-            <a:pPr lvl="1">
-              <a:buFont typeface="Arial" panose="020B0604020202020204" pitchFamily="34" charset="0"/>
-              <a:buChar char="•"/>
-            </a:pPr>
-            <a:r>
-              <a:rPr lang="pt-BR" dirty="0"/>
-              <a:t>Plataformas</a:t>
-            </a:r>
-            <a:endParaRPr lang="pt-BR" dirty="0"/>
-          </a:p>
-          <a:p>
-            <a:pPr lvl="1">
-              <a:buFont typeface="Arial" panose="020B0604020202020204" pitchFamily="34" charset="0"/>
-              <a:buChar char="•"/>
-            </a:pPr>
-            <a:r>
-              <a:rPr lang="pt-BR" dirty="0"/>
-              <a:t>Visual Studio Code versão 1.45.1</a:t>
-            </a:r>
-            <a:endParaRPr lang="pt-BR" dirty="0"/>
-          </a:p>
-          <a:p>
-            <a:pPr lvl="1">
-              <a:buFont typeface="Arial" panose="020B0604020202020204" pitchFamily="34" charset="0"/>
-              <a:buChar char="•"/>
-            </a:pPr>
-            <a:r>
-              <a:rPr lang="pt-BR" dirty="0"/>
-              <a:t>Anaconda versão 1.9.12</a:t>
-            </a:r>
-            <a:endParaRPr lang="pt-BR" dirty="0"/>
-          </a:p>
-          <a:p>
-            <a:pPr lvl="1">
-              <a:buFont typeface="Arial" panose="020B0604020202020204" pitchFamily="34" charset="0"/>
-              <a:buChar char="•"/>
-            </a:pPr>
-            <a:r>
-              <a:rPr lang="pt-BR" dirty="0"/>
-              <a:t>Python versão 3.7</a:t>
-            </a:r>
-            <a:endParaRPr lang="pt-BR" dirty="0"/>
-          </a:p>
-          <a:p>
-            <a:pPr lvl="1">
-              <a:buFont typeface="Arial" panose="020B0604020202020204" pitchFamily="34" charset="0"/>
-              <a:buChar char="•"/>
-            </a:pPr>
-            <a:endParaRPr lang="pt-BR" dirty="0"/>
-          </a:p>
-          <a:p>
-            <a:endParaRPr lang="pt-BR" dirty="0"/>
+            <a:endParaRPr lang="pt-BR" sz="2400" dirty="0"/>
+          </a:p>
+          <a:p>
+            <a:endParaRPr lang="pt-BR" sz="2400" dirty="0"/>
           </a:p>
         </p:txBody>
       </p:sp>

</xml_diff>

<commit_message>
Roteito pitch e melhorias
</commit_message>
<xml_diff>
--- a/Documentos/ModeloApresentaçãoFacens_Sugestão.pptx
+++ b/Documentos/ModeloApresentaçãoFacens_Sugestão.pptx
@@ -8,7 +8,7 @@
     <p:notesMasterId r:id="rId5"/>
   </p:notesMasterIdLst>
   <p:handoutMasterIdLst>
-    <p:handoutMasterId r:id="rId12"/>
+    <p:handoutMasterId r:id="rId13"/>
   </p:handoutMasterIdLst>
   <p:sldIdLst>
     <p:sldId id="256" r:id="rId3"/>
@@ -18,7 +18,8 @@
     <p:sldId id="264" r:id="rId8"/>
     <p:sldId id="265" r:id="rId9"/>
     <p:sldId id="266" r:id="rId10"/>
-    <p:sldId id="267" r:id="rId11"/>
+    <p:sldId id="269" r:id="rId11"/>
+    <p:sldId id="267" r:id="rId12"/>
   </p:sldIdLst>
   <p:sldSz cx="9144000" cy="6858000" type="screen4x3"/>
   <p:notesSz cx="6797675" cy="9926320"/>
@@ -2430,7 +2431,23 @@
             </a:pPr>
             <a:r>
               <a:rPr lang="pt-BR" dirty="0"/>
-              <a:t>Colocar em tópicos os principais pontos chave do trabalho.</a:t>
+              <a:t>Realizar a coleta de notícias com </a:t>
+            </a:r>
+            <a:r>
+              <a:rPr lang="pt-BR" i="1" dirty="0" err="1"/>
+              <a:t>webscrapping</a:t>
+            </a:r>
+            <a:r>
+              <a:rPr lang="pt-BR" dirty="0"/>
+              <a:t> e </a:t>
+            </a:r>
+            <a:r>
+              <a:rPr lang="pt-BR" i="1" dirty="0" err="1"/>
+              <a:t>datasets</a:t>
+            </a:r>
+            <a:r>
+              <a:rPr lang="pt-BR" dirty="0"/>
+              <a:t> prontos</a:t>
             </a:r>
             <a:endParaRPr lang="pt-BR" dirty="0"/>
           </a:p>
@@ -2441,18 +2458,7 @@
             </a:pPr>
             <a:r>
               <a:rPr lang="pt-BR" dirty="0"/>
-              <a:t>Inserir os objetivos primários do trabalho e deixá-los evidentes.</a:t>
-            </a:r>
-            <a:endParaRPr lang="pt-BR" dirty="0"/>
-          </a:p>
-          <a:p>
-            <a:pPr lvl="1">
-              <a:buFont typeface="Arial" panose="020B0604020202020204" pitchFamily="34" charset="0"/>
-              <a:buChar char="•"/>
-            </a:pPr>
-            <a:r>
-              <a:rPr lang="pt-BR" dirty="0"/>
-              <a:t>Coletar notícias com títulos em sites</a:t>
+              <a:t>Implementar algoritmo que seja capaz de realizar a sumarização das notícias </a:t>
             </a:r>
             <a:endParaRPr lang="pt-BR" dirty="0"/>
           </a:p>
@@ -2544,20 +2550,65 @@
         </p:nvSpPr>
         <p:spPr/>
         <p:txBody>
-          <a:bodyPr/>
+          <a:bodyPr>
+            <a:normAutofit lnSpcReduction="10000"/>
+          </a:bodyPr>
           <a:lstStyle/>
           <a:p>
-            <a:pPr lvl="1">
+            <a:pPr lvl="1" algn="l">
+              <a:buClrTx/>
+              <a:buSzTx/>
               <a:buFont typeface="Arial" panose="020B0604020202020204" pitchFamily="34" charset="0"/>
               <a:buChar char="•"/>
             </a:pPr>
             <a:r>
               <a:rPr lang="pt-BR" dirty="0"/>
-              <a:t>Descrever no formato de tópico ou tabela os trabalhos/pesquisas/iniciativas/apps que são semelhante ao que é proposto no trabalho.</a:t>
+              <a:t>Chen, K., Corrado, G., Dean, J., Tomas, M., &amp; Sutskever, I. (s.d.). Distribuited representations of words and phrases and their compositionality.</a:t>
             </a:r>
             <a:endParaRPr lang="pt-BR" dirty="0"/>
           </a:p>
           <a:p>
+            <a:pPr lvl="1" algn="l">
+              <a:buClrTx/>
+              <a:buSzTx/>
+              <a:buFont typeface="Arial" panose="020B0604020202020204" pitchFamily="34" charset="0"/>
+              <a:buChar char="•"/>
+            </a:pPr>
+            <a:endParaRPr lang="pt-BR" dirty="0"/>
+          </a:p>
+          <a:p>
+            <a:pPr lvl="1" algn="l">
+              <a:buClrTx/>
+              <a:buSzTx/>
+              <a:buFont typeface="Arial" panose="020B0604020202020204" pitchFamily="34" charset="0"/>
+              <a:buChar char="•"/>
+            </a:pPr>
+            <a:r>
+              <a:rPr lang="pt-BR" dirty="0"/>
+              <a:t>Kryscinski, W., Keshar, N. S., McCAnn, B., Xiong, C., &amp; Socher, R. (2019). Neural text summarization: A critical evaluation.</a:t>
+            </a:r>
+            <a:endParaRPr lang="pt-BR" dirty="0"/>
+          </a:p>
+          <a:p>
+            <a:pPr lvl="1" algn="l">
+              <a:buClrTx/>
+              <a:buSzTx/>
+              <a:buFont typeface="Arial" panose="020B0604020202020204" pitchFamily="34" charset="0"/>
+              <a:buChar char="•"/>
+            </a:pPr>
+            <a:endParaRPr lang="pt-BR" dirty="0"/>
+          </a:p>
+          <a:p>
+            <a:pPr lvl="1" algn="l">
+              <a:buClrTx/>
+              <a:buSzTx/>
+              <a:buFont typeface="Arial" panose="020B0604020202020204" pitchFamily="34" charset="0"/>
+              <a:buChar char="•"/>
+            </a:pPr>
+            <a:r>
+              <a:rPr lang="pt-BR" dirty="0"/>
+              <a:t>Luo, Q., Xu, W., &amp; Guo, J. (2014). A study on the CBOW model's overfitting and stability.</a:t>
+            </a:r>
             <a:endParaRPr lang="pt-BR" dirty="0"/>
           </a:p>
         </p:txBody>
@@ -2635,7 +2686,15 @@
             </a:pPr>
             <a:r>
               <a:rPr lang="pt-BR" dirty="0"/>
-              <a:t>Inserir os detalhes do que foi exposto no Documento do Projeto, ou seja, detalhar o que será feito e o que não será feito.</a:t>
+              <a:t>Implementação de um </a:t>
+            </a:r>
+            <a:r>
+              <a:rPr lang="pt-BR" i="1" dirty="0" err="1"/>
+              <a:t>webscrapping</a:t>
+            </a:r>
+            <a:r>
+              <a:rPr lang="pt-BR" dirty="0"/>
+              <a:t> para coleta das notícias</a:t>
             </a:r>
             <a:endParaRPr lang="pt-BR" dirty="0"/>
           </a:p>
@@ -2646,7 +2705,7 @@
             </a:pPr>
             <a:r>
               <a:rPr lang="pt-BR" dirty="0"/>
-              <a:t>Implementação para coleta de dados de qualidade do algoritmo.</a:t>
+              <a:t>Implementação de algoritmo capaz de realizar a sumarização</a:t>
             </a:r>
             <a:endParaRPr lang="pt-BR" dirty="0"/>
           </a:p>
@@ -2657,7 +2716,15 @@
             </a:pPr>
             <a:r>
               <a:rPr lang="pt-BR" dirty="0"/>
-              <a:t>Obter os dados em menor quantidade para melhorar a análise</a:t>
+              <a:t>Coletar </a:t>
+            </a:r>
+            <a:r>
+              <a:rPr lang="pt-BR" i="1" dirty="0" err="1"/>
+              <a:t>dataset</a:t>
+            </a:r>
+            <a:r>
+              <a:rPr lang="pt-BR" dirty="0"/>
+              <a:t> com um número maior de notícias para poder obter um melhor resultado</a:t>
             </a:r>
             <a:endParaRPr lang="pt-BR" dirty="0"/>
           </a:p>
@@ -2841,7 +2908,7 @@
           <a:p>
             <a:r>
               <a:rPr lang="pt-BR" sz="3200" dirty="0"/>
-              <a:t>Metas para o TCC2</a:t>
+              <a:t>Demonstração do Protótipo </a:t>
             </a:r>
             <a:endParaRPr lang="pt-BR" sz="3200" dirty="0"/>
           </a:p>
@@ -2857,21 +2924,107 @@
             <p:ph idx="1"/>
           </p:nvPr>
         </p:nvSpPr>
-        <p:spPr/>
-        <p:txBody>
-          <a:bodyPr/>
+        <p:spPr>
+          <a:xfrm>
+            <a:off x="457200" y="1261110"/>
+            <a:ext cx="8229600" cy="3055620"/>
+          </a:xfrm>
+        </p:spPr>
+        <p:txBody>
+          <a:bodyPr>
+            <a:normAutofit/>
+          </a:bodyPr>
           <a:lstStyle/>
+          <a:p>
+            <a:pPr marL="457200" lvl="1" indent="0">
+              <a:buFont typeface="Arial" panose="020B0604020202020204" pitchFamily="34" charset="0"/>
+              <a:buNone/>
+            </a:pPr>
+            <a:endParaRPr lang="pt-BR" dirty="0"/>
+          </a:p>
+          <a:p>
+            <a:pPr marL="457200" lvl="1" indent="0">
+              <a:buFont typeface="Arial" panose="020B0604020202020204" pitchFamily="34" charset="0"/>
+              <a:buNone/>
+            </a:pPr>
+            <a:endParaRPr lang="pt-BR" sz="2400" dirty="0"/>
+          </a:p>
           <a:p>
             <a:pPr lvl="1">
               <a:buFont typeface="Arial" panose="020B0604020202020204" pitchFamily="34" charset="0"/>
               <a:buChar char="•"/>
             </a:pPr>
-            <a:r>
-              <a:rPr lang="pt-BR" dirty="0"/>
-              <a:t>Quais são os objetivos do TCC2, ou seja, são alguns comentários que podem ser realizados no final da demonstração do protótipo.</a:t>
-            </a:r>
-            <a:endParaRPr lang="pt-BR" dirty="0"/>
-          </a:p>
+            <a:endParaRPr lang="pt-BR" sz="2400" dirty="0"/>
+          </a:p>
+          <a:p>
+            <a:endParaRPr lang="pt-BR" sz="2400" dirty="0"/>
+          </a:p>
+        </p:txBody>
+      </p:sp>
+    </p:spTree>
+  </p:cSld>
+  <p:clrMapOvr>
+    <a:masterClrMapping/>
+  </p:clrMapOvr>
+</p:sld>
+</file>
+
+<file path=ppt/slides/slide9.xml><?xml version="1.0" encoding="utf-8"?>
+<p:sld xmlns:a="http://schemas.openxmlformats.org/drawingml/2006/main" xmlns:r="http://schemas.openxmlformats.org/officeDocument/2006/relationships" xmlns:p="http://schemas.openxmlformats.org/presentationml/2006/main">
+  <p:cSld>
+    <p:spTree>
+      <p:nvGrpSpPr>
+        <p:cNvPr id="1" name=""/>
+        <p:cNvGrpSpPr/>
+        <p:nvPr/>
+      </p:nvGrpSpPr>
+      <p:grpSpPr>
+        <a:xfrm>
+          <a:off x="0" y="0"/>
+          <a:ext cx="0" cy="0"/>
+          <a:chOff x="0" y="0"/>
+          <a:chExt cx="0" cy="0"/>
+        </a:xfrm>
+      </p:grpSpPr>
+      <p:sp>
+        <p:nvSpPr>
+          <p:cNvPr id="2" name="Título 1"/>
+          <p:cNvSpPr>
+            <a:spLocks noGrp="1"/>
+          </p:cNvSpPr>
+          <p:nvPr>
+            <p:ph type="title"/>
+          </p:nvPr>
+        </p:nvSpPr>
+        <p:spPr/>
+        <p:txBody>
+          <a:bodyPr>
+            <a:normAutofit/>
+          </a:bodyPr>
+          <a:lstStyle/>
+          <a:p>
+            <a:r>
+              <a:rPr lang="pt-BR" sz="3200" dirty="0"/>
+              <a:t>Metas para o TCC2</a:t>
+            </a:r>
+            <a:endParaRPr lang="pt-BR" sz="3200" dirty="0"/>
+          </a:p>
+        </p:txBody>
+      </p:sp>
+      <p:sp>
+        <p:nvSpPr>
+          <p:cNvPr id="3" name="Espaço Reservado para Conteúdo 2"/>
+          <p:cNvSpPr>
+            <a:spLocks noGrp="1"/>
+          </p:cNvSpPr>
+          <p:nvPr>
+            <p:ph idx="1"/>
+          </p:nvPr>
+        </p:nvSpPr>
+        <p:spPr/>
+        <p:txBody>
+          <a:bodyPr/>
+          <a:lstStyle/>
           <a:p>
             <a:pPr lvl="1">
               <a:buFont typeface="Arial" panose="020B0604020202020204" pitchFamily="34" charset="0"/>
@@ -2879,7 +3032,7 @@
             </a:pPr>
             <a:r>
               <a:rPr lang="pt-BR" dirty="0"/>
-              <a:t>Evoluir o protótipo </a:t>
+              <a:t>Analisar os dados do TCC1</a:t>
             </a:r>
             <a:endParaRPr lang="pt-BR" dirty="0"/>
           </a:p>
@@ -2890,7 +3043,7 @@
             </a:pPr>
             <a:r>
               <a:rPr lang="pt-BR" dirty="0"/>
-              <a:t>Aumentar a quantidade de notícias a ser analisada</a:t>
+              <a:t>Com base nos dados levantados no TCC1, evoluir o protótipo</a:t>
             </a:r>
             <a:endParaRPr lang="pt-BR" dirty="0"/>
           </a:p>
@@ -2901,7 +3054,15 @@
             </a:pPr>
             <a:r>
               <a:rPr lang="pt-BR" dirty="0"/>
-              <a:t>Analisar os dados do TCC1</a:t>
+              <a:t>Aumentar o </a:t>
+            </a:r>
+            <a:r>
+              <a:rPr lang="pt-BR" i="1" dirty="0" err="1"/>
+              <a:t>dataset</a:t>
+            </a:r>
+            <a:r>
+              <a:rPr lang="pt-BR" dirty="0"/>
+              <a:t> de notícias a ser analisada</a:t>
             </a:r>
             <a:endParaRPr lang="pt-BR" dirty="0"/>
           </a:p>

</xml_diff>

<commit_message>
Correções na versão e no tópico protótipo
</commit_message>
<xml_diff>
--- a/Documentos/ModeloApresentaçãoFacens_Sugestão.pptx
+++ b/Documentos/ModeloApresentaçãoFacens_Sugestão.pptx
@@ -5,24 +5,24 @@
     <p:sldMasterId id="2147483648" r:id="rId1"/>
   </p:sldMasterIdLst>
   <p:notesMasterIdLst>
-    <p:notesMasterId r:id="rId5"/>
+    <p:notesMasterId r:id="rId11"/>
   </p:notesMasterIdLst>
   <p:handoutMasterIdLst>
-    <p:handoutMasterId r:id="rId13"/>
+    <p:handoutMasterId r:id="rId12"/>
   </p:handoutMasterIdLst>
   <p:sldIdLst>
-    <p:sldId id="256" r:id="rId3"/>
-    <p:sldId id="261" r:id="rId4"/>
-    <p:sldId id="262" r:id="rId6"/>
-    <p:sldId id="263" r:id="rId7"/>
-    <p:sldId id="264" r:id="rId8"/>
-    <p:sldId id="265" r:id="rId9"/>
-    <p:sldId id="266" r:id="rId10"/>
-    <p:sldId id="269" r:id="rId11"/>
-    <p:sldId id="267" r:id="rId12"/>
+    <p:sldId id="256" r:id="rId2"/>
+    <p:sldId id="261" r:id="rId3"/>
+    <p:sldId id="262" r:id="rId4"/>
+    <p:sldId id="263" r:id="rId5"/>
+    <p:sldId id="264" r:id="rId6"/>
+    <p:sldId id="265" r:id="rId7"/>
+    <p:sldId id="266" r:id="rId8"/>
+    <p:sldId id="269" r:id="rId9"/>
+    <p:sldId id="267" r:id="rId10"/>
   </p:sldIdLst>
   <p:sldSz cx="9144000" cy="6858000" type="screen4x3"/>
-  <p:notesSz cx="6797675" cy="9926320"/>
+  <p:notesSz cx="6797675" cy="9926638"/>
   <p:defaultTextStyle>
     <a:defPPr>
       <a:defRPr lang="en-US"/>
@@ -118,6 +118,22 @@
       </a:defRPr>
     </a:lvl9pPr>
   </p:defaultTextStyle>
+  <p:extLst>
+    <p:ext uri="{EFAFB233-063F-42B5-8137-9DF3F51BA10A}">
+      <p15:sldGuideLst xmlns:p15="http://schemas.microsoft.com/office/powerpoint/2012/main">
+        <p15:guide id="1" orient="horz" pos="2160">
+          <p15:clr>
+            <a:srgbClr val="A4A3A4"/>
+          </p15:clr>
+        </p15:guide>
+        <p15:guide id="2" pos="2880">
+          <p15:clr>
+            <a:srgbClr val="A4A3A4"/>
+          </p15:clr>
+        </p15:guide>
+      </p15:sldGuideLst>
+    </p:ext>
+  </p:extLst>
 </p:presentation>
 </file>
 
@@ -203,6 +219,7 @@
           <a:p>
             <a:fld id="{7ECD3911-201F-4F64-B2AA-E90B7DC33211}" type="datetimeFigureOut">
               <a:rPr lang="pt-BR" smtClean="0"/>
+              <a:t>06/06/2020</a:t>
             </a:fld>
             <a:endParaRPr lang="pt-BR"/>
           </a:p>
@@ -268,6 +285,7 @@
           <a:p>
             <a:fld id="{6343EDCF-FF4B-4A5B-9AEA-F2A2B388A7A1}" type="slidenum">
               <a:rPr lang="pt-BR" smtClean="0"/>
+              <a:t>‹nº›</a:t>
             </a:fld>
             <a:endParaRPr lang="pt-BR"/>
           </a:p>
@@ -361,6 +379,7 @@
           <a:p>
             <a:fld id="{D2C35F58-1FB0-451C-9DAF-31219BC95F97}" type="datetimeFigureOut">
               <a:rPr lang="pt-BR" smtClean="0"/>
+              <a:t>06/06/2020</a:t>
             </a:fld>
             <a:endParaRPr lang="pt-BR"/>
           </a:p>
@@ -427,7 +446,6 @@
               <a:rPr lang="pt-BR"/>
               <a:t>Clique para editar o texto mestre</a:t>
             </a:r>
-            <a:endParaRPr lang="pt-BR"/>
           </a:p>
           <a:p>
             <a:pPr lvl="1"/>
@@ -435,7 +453,6 @@
               <a:rPr lang="pt-BR"/>
               <a:t>Segundo nível</a:t>
             </a:r>
-            <a:endParaRPr lang="pt-BR"/>
           </a:p>
           <a:p>
             <a:pPr lvl="2"/>
@@ -443,7 +460,6 @@
               <a:rPr lang="pt-BR"/>
               <a:t>Terceiro nível</a:t>
             </a:r>
-            <a:endParaRPr lang="pt-BR"/>
           </a:p>
           <a:p>
             <a:pPr lvl="3"/>
@@ -451,7 +467,6 @@
               <a:rPr lang="pt-BR"/>
               <a:t>Quarto nível</a:t>
             </a:r>
-            <a:endParaRPr lang="pt-BR"/>
           </a:p>
           <a:p>
             <a:pPr lvl="4"/>
@@ -459,7 +474,6 @@
               <a:rPr lang="pt-BR"/>
               <a:t>Quinto nível</a:t>
             </a:r>
-            <a:endParaRPr lang="pt-BR"/>
           </a:p>
         </p:txBody>
       </p:sp>
@@ -523,6 +537,7 @@
           <a:p>
             <a:fld id="{675E6EDB-C278-4D2C-A473-970BC2FB1D82}" type="slidenum">
               <a:rPr lang="pt-BR" smtClean="0"/>
+              <a:t>‹nº›</a:t>
             </a:fld>
             <a:endParaRPr lang="pt-BR"/>
           </a:p>
@@ -693,6 +708,7 @@
           <a:p>
             <a:fld id="{404592BD-A84E-44A3-8DF7-E6ED0C1DA784}" type="slidenum">
               <a:rPr lang="en-US" smtClean="0"/>
+              <a:t>2</a:t>
             </a:fld>
             <a:endParaRPr lang="en-US"/>
           </a:p>
@@ -880,13 +896,6 @@
               </a:rPr>
               <a:t>Texto texto texto texto texto texto texto texto texto texto</a:t>
             </a:r>
-            <a:endParaRPr lang="pt-BR" dirty="0">
-              <a:solidFill>
-                <a:srgbClr val="7D7D7D"/>
-              </a:solidFill>
-              <a:latin typeface="Arial" panose="020B0604020202020204"/>
-              <a:cs typeface="Arial" panose="020B0604020202020204"/>
-            </a:endParaRPr>
           </a:p>
           <a:p>
             <a:r>
@@ -923,6 +932,7 @@
           <a:p>
             <a:fld id="{67F52712-0C15-3A47-A7D6-F57ACAF250B6}" type="datetimeFigureOut">
               <a:rPr lang="en-US" smtClean="0"/>
+              <a:t>6/6/2020</a:t>
             </a:fld>
             <a:endParaRPr lang="en-US"/>
           </a:p>
@@ -964,6 +974,7 @@
           <a:p>
             <a:fld id="{11F1D6AB-D093-5345-B7D2-3D02BAD5547F}" type="slidenum">
               <a:rPr lang="en-US" smtClean="0"/>
+              <a:t>‹nº›</a:t>
             </a:fld>
             <a:endParaRPr lang="en-US"/>
           </a:p>
@@ -1037,7 +1048,6 @@
               <a:rPr lang="bg-BG"/>
               <a:t>Click to edit Master text styles</a:t>
             </a:r>
-            <a:endParaRPr lang="bg-BG"/>
           </a:p>
           <a:p>
             <a:pPr lvl="1"/>
@@ -1045,7 +1055,6 @@
               <a:rPr lang="bg-BG"/>
               <a:t>Second level</a:t>
             </a:r>
-            <a:endParaRPr lang="bg-BG"/>
           </a:p>
           <a:p>
             <a:pPr lvl="2"/>
@@ -1053,7 +1062,6 @@
               <a:rPr lang="bg-BG"/>
               <a:t>Third level</a:t>
             </a:r>
-            <a:endParaRPr lang="bg-BG"/>
           </a:p>
           <a:p>
             <a:pPr lvl="3"/>
@@ -1061,7 +1069,6 @@
               <a:rPr lang="bg-BG"/>
               <a:t>Fourth level</a:t>
             </a:r>
-            <a:endParaRPr lang="bg-BG"/>
           </a:p>
           <a:p>
             <a:pPr lvl="4"/>
@@ -1090,6 +1097,7 @@
           <a:p>
             <a:fld id="{67F52712-0C15-3A47-A7D6-F57ACAF250B6}" type="datetimeFigureOut">
               <a:rPr lang="en-US" smtClean="0"/>
+              <a:t>6/6/2020</a:t>
             </a:fld>
             <a:endParaRPr lang="en-US"/>
           </a:p>
@@ -1131,6 +1139,7 @@
           <a:p>
             <a:fld id="{11F1D6AB-D093-5345-B7D2-3D02BAD5547F}" type="slidenum">
               <a:rPr lang="en-US" smtClean="0"/>
+              <a:t>‹nº›</a:t>
             </a:fld>
             <a:endParaRPr lang="en-US"/>
           </a:p>
@@ -1178,6 +1187,7 @@
           <a:p>
             <a:fld id="{67F52712-0C15-3A47-A7D6-F57ACAF250B6}" type="datetimeFigureOut">
               <a:rPr lang="en-US" smtClean="0"/>
+              <a:t>6/6/2020</a:t>
             </a:fld>
             <a:endParaRPr lang="en-US"/>
           </a:p>
@@ -1219,6 +1229,7 @@
           <a:p>
             <a:fld id="{11F1D6AB-D093-5345-B7D2-3D02BAD5547F}" type="slidenum">
               <a:rPr lang="en-US" smtClean="0"/>
+              <a:t>‹nº›</a:t>
             </a:fld>
             <a:endParaRPr lang="en-US"/>
           </a:p>
@@ -1238,7 +1249,7 @@
     <p:bg>
       <p:bgPr>
         <a:blipFill dpi="0" rotWithShape="1">
-          <a:blip r:embed="rId4">
+          <a:blip r:embed="rId5">
             <a:lum/>
           </a:blip>
           <a:srcRect/>
@@ -1298,13 +1309,6 @@
               </a:rPr>
               <a:t>Título</a:t>
             </a:r>
-            <a:endParaRPr lang="pt-BR" sz="2400" b="1" dirty="0">
-              <a:solidFill>
-                <a:srgbClr val="00AEEF"/>
-              </a:solidFill>
-              <a:latin typeface="Arial" panose="020B0604020202020204"/>
-              <a:cs typeface="Arial" panose="020B0604020202020204"/>
-            </a:endParaRPr>
           </a:p>
         </p:txBody>
       </p:sp>
@@ -1343,13 +1347,6 @@
               </a:rPr>
               <a:t>Texto e tópicos</a:t>
             </a:r>
-            <a:endParaRPr lang="pt-BR" sz="1600" dirty="0">
-              <a:solidFill>
-                <a:srgbClr val="7D7D7D"/>
-              </a:solidFill>
-              <a:latin typeface="Arial" panose="020B0604020202020204"/>
-              <a:cs typeface="Arial" panose="020B0604020202020204"/>
-            </a:endParaRPr>
           </a:p>
           <a:p>
             <a:r>
@@ -1362,13 +1359,6 @@
               </a:rPr>
               <a:t>Texto e tópicos</a:t>
             </a:r>
-            <a:endParaRPr lang="pt-BR" sz="1600" dirty="0">
-              <a:solidFill>
-                <a:srgbClr val="7D7D7D"/>
-              </a:solidFill>
-              <a:latin typeface="Arial" panose="020B0604020202020204"/>
-              <a:cs typeface="Arial" panose="020B0604020202020204"/>
-            </a:endParaRPr>
           </a:p>
           <a:p>
             <a:r>
@@ -1381,13 +1371,6 @@
               </a:rPr>
               <a:t>Texto e tópicos</a:t>
             </a:r>
-            <a:endParaRPr lang="pt-BR" sz="1600" dirty="0">
-              <a:solidFill>
-                <a:srgbClr val="7D7D7D"/>
-              </a:solidFill>
-              <a:latin typeface="Arial" panose="020B0604020202020204"/>
-              <a:cs typeface="Arial" panose="020B0604020202020204"/>
-            </a:endParaRPr>
           </a:p>
           <a:p>
             <a:r>
@@ -1400,13 +1383,6 @@
               </a:rPr>
               <a:t>Texto e tópicos</a:t>
             </a:r>
-            <a:endParaRPr lang="pt-BR" sz="1600" dirty="0">
-              <a:solidFill>
-                <a:srgbClr val="7D7D7D"/>
-              </a:solidFill>
-              <a:latin typeface="Arial" panose="020B0604020202020204"/>
-              <a:cs typeface="Arial" panose="020B0604020202020204"/>
-            </a:endParaRPr>
           </a:p>
           <a:p>
             <a:r>
@@ -1419,13 +1395,6 @@
               </a:rPr>
               <a:t>Texto e tópicos</a:t>
             </a:r>
-            <a:endParaRPr lang="pt-BR" sz="1600" dirty="0">
-              <a:solidFill>
-                <a:srgbClr val="7D7D7D"/>
-              </a:solidFill>
-              <a:latin typeface="Arial" panose="020B0604020202020204"/>
-              <a:cs typeface="Arial" panose="020B0604020202020204"/>
-            </a:endParaRPr>
           </a:p>
           <a:p>
             <a:r>
@@ -1438,13 +1407,6 @@
               </a:rPr>
               <a:t>Texto e tópicos</a:t>
             </a:r>
-            <a:endParaRPr lang="pt-BR" sz="1600" dirty="0">
-              <a:solidFill>
-                <a:srgbClr val="7D7D7D"/>
-              </a:solidFill>
-              <a:latin typeface="Arial" panose="020B0604020202020204"/>
-              <a:cs typeface="Arial" panose="020B0604020202020204"/>
-            </a:endParaRPr>
           </a:p>
           <a:p>
             <a:pPr lvl="0"/>
@@ -1487,6 +1449,7 @@
           <a:p>
             <a:fld id="{67F52712-0C15-3A47-A7D6-F57ACAF250B6}" type="datetimeFigureOut">
               <a:rPr lang="en-US" smtClean="0"/>
+              <a:t>6/6/2020</a:t>
             </a:fld>
             <a:endParaRPr lang="en-US"/>
           </a:p>
@@ -1564,6 +1527,7 @@
           <a:p>
             <a:fld id="{11F1D6AB-D093-5345-B7D2-3D02BAD5547F}" type="slidenum">
               <a:rPr lang="en-US" smtClean="0"/>
+              <a:t>‹nº›</a:t>
             </a:fld>
             <a:endParaRPr lang="en-US"/>
           </a:p>
@@ -1858,7 +1822,7 @@
           <p:nvPr/>
         </p:nvPicPr>
         <p:blipFill>
-          <a:blip r:embed="rId1">
+          <a:blip r:embed="rId2">
             <a:extLst>
               <a:ext uri="{28A0092B-C50C-407E-A947-70E740481C1C}">
                 <a14:useLocalDpi xmlns:a14="http://schemas.microsoft.com/office/drawing/2010/main" val="0"/>
@@ -1935,11 +1899,6 @@
               </a:rPr>
               <a:t>Trabalho de Conclusão de Curso</a:t>
             </a:r>
-            <a:endParaRPr lang="pt-BR" sz="3500" b="1" dirty="0">
-              <a:solidFill>
-                <a:srgbClr val="00AEEF"/>
-              </a:solidFill>
-            </a:endParaRPr>
           </a:p>
         </p:txBody>
       </p:sp>
@@ -1978,11 +1937,6 @@
               </a:rPr>
               <a:t>Sumarização de Textos</a:t>
             </a:r>
-            <a:endParaRPr lang="pt-BR" sz="3000" b="1" cap="small" dirty="0">
-              <a:solidFill>
-                <a:schemeClr val="tx2"/>
-              </a:solidFill>
-            </a:endParaRPr>
           </a:p>
           <a:p>
             <a:pPr lvl="0">
@@ -2013,12 +1967,6 @@
               </a:rPr>
               <a:t>Alunos:  </a:t>
             </a:r>
-            <a:endParaRPr lang="pt-BR" sz="3000" cap="small" dirty="0">
-              <a:solidFill>
-                <a:schemeClr val="tx2"/>
-              </a:solidFill>
-              <a:latin typeface="+mj-lt"/>
-            </a:endParaRPr>
           </a:p>
           <a:p>
             <a:pPr lvl="0">
@@ -2036,12 +1984,6 @@
               </a:rPr>
               <a:t>Guilherme Proença Cravo da Costa 160068</a:t>
             </a:r>
-            <a:endParaRPr lang="pt-BR" sz="3000" cap="small" dirty="0">
-              <a:solidFill>
-                <a:schemeClr val="tx2"/>
-              </a:solidFill>
-              <a:latin typeface="+mj-lt"/>
-            </a:endParaRPr>
           </a:p>
           <a:p>
             <a:pPr lvl="0">
@@ -2061,14 +2003,6 @@
               </a:rPr>
               <a:t>Renato Druzian 121058</a:t>
             </a:r>
-            <a:endParaRPr lang="pt-BR" sz="3000" cap="small" dirty="0">
-              <a:solidFill>
-                <a:schemeClr val="tx2"/>
-              </a:solidFill>
-              <a:latin typeface="+mj-lt"/>
-              <a:ea typeface="+mj-ea"/>
-              <a:cs typeface="+mj-cs"/>
-            </a:endParaRPr>
           </a:p>
           <a:p>
             <a:pPr lvl="0">
@@ -2104,14 +2038,6 @@
               </a:rPr>
               <a:t>Orientador: Prof. Johannes von Lochter</a:t>
             </a:r>
-            <a:endParaRPr lang="pt-BR" sz="3000" cap="small" dirty="0">
-              <a:solidFill>
-                <a:schemeClr val="tx2"/>
-              </a:solidFill>
-              <a:latin typeface="+mj-lt"/>
-              <a:ea typeface="+mj-ea"/>
-              <a:cs typeface="+mj-cs"/>
-            </a:endParaRPr>
           </a:p>
         </p:txBody>
       </p:sp>
@@ -2220,7 +2146,6 @@
               <a:rPr lang="pt-BR" sz="3200" dirty="0"/>
               <a:t>Engenharia de Computação</a:t>
             </a:r>
-            <a:endParaRPr lang="pt-BR" sz="3200" dirty="0"/>
           </a:p>
         </p:txBody>
       </p:sp>
@@ -2271,7 +2196,6 @@
               <a:rPr lang="pt-BR" sz="3200" dirty="0"/>
               <a:t>Agenda</a:t>
             </a:r>
-            <a:endParaRPr lang="pt-BR" sz="3200" dirty="0"/>
           </a:p>
         </p:txBody>
       </p:sp>
@@ -2298,7 +2222,6 @@
               <a:rPr lang="pt-BR" dirty="0"/>
               <a:t>Introdução</a:t>
             </a:r>
-            <a:endParaRPr lang="pt-BR" dirty="0"/>
           </a:p>
           <a:p>
             <a:pPr lvl="1">
@@ -2309,7 +2232,6 @@
               <a:rPr lang="pt-BR" dirty="0"/>
               <a:t>Trabalhos correlatos</a:t>
             </a:r>
-            <a:endParaRPr lang="pt-BR" dirty="0"/>
           </a:p>
           <a:p>
             <a:pPr lvl="1">
@@ -2320,7 +2242,6 @@
               <a:rPr lang="pt-BR" dirty="0"/>
               <a:t>Escopo do projeto</a:t>
             </a:r>
-            <a:endParaRPr lang="pt-BR" dirty="0"/>
           </a:p>
           <a:p>
             <a:pPr lvl="1">
@@ -2331,7 +2252,6 @@
               <a:rPr lang="pt-BR" dirty="0"/>
               <a:t>Recursos utilizados</a:t>
             </a:r>
-            <a:endParaRPr lang="pt-BR" dirty="0"/>
           </a:p>
           <a:p>
             <a:pPr lvl="1">
@@ -2342,7 +2262,6 @@
               <a:rPr lang="pt-BR" dirty="0"/>
               <a:t>Demonstração do Protótipo</a:t>
             </a:r>
-            <a:endParaRPr lang="pt-BR" dirty="0"/>
           </a:p>
           <a:p>
             <a:pPr lvl="1">
@@ -2353,7 +2272,6 @@
               <a:rPr lang="pt-BR" dirty="0"/>
               <a:t>Metas para o TCC2</a:t>
             </a:r>
-            <a:endParaRPr lang="pt-BR" dirty="0"/>
           </a:p>
           <a:p>
             <a:endParaRPr lang="pt-BR" dirty="0"/>
@@ -2406,7 +2324,6 @@
               <a:rPr lang="pt-BR" sz="3200" dirty="0"/>
               <a:t>Introdução</a:t>
             </a:r>
-            <a:endParaRPr lang="pt-BR" sz="3200" dirty="0"/>
           </a:p>
         </p:txBody>
       </p:sp>
@@ -2449,7 +2366,6 @@
               <a:rPr lang="pt-BR" dirty="0"/>
               <a:t> prontos</a:t>
             </a:r>
-            <a:endParaRPr lang="pt-BR" dirty="0"/>
           </a:p>
           <a:p>
             <a:pPr lvl="1">
@@ -2460,7 +2376,6 @@
               <a:rPr lang="pt-BR" dirty="0"/>
               <a:t>Implementar algoritmo que seja capaz de realizar a sumarização das notícias </a:t>
             </a:r>
-            <a:endParaRPr lang="pt-BR" dirty="0"/>
           </a:p>
           <a:p>
             <a:pPr lvl="1">
@@ -2534,7 +2449,6 @@
               <a:rPr lang="pt-BR" sz="3200" dirty="0"/>
               <a:t>Trabalhos Correlatos</a:t>
             </a:r>
-            <a:endParaRPr lang="pt-BR" sz="3200" dirty="0"/>
           </a:p>
         </p:txBody>
       </p:sp>
@@ -2565,7 +2479,6 @@
               <a:rPr lang="pt-BR" dirty="0"/>
               <a:t>Chen, K., Corrado, G., Dean, J., Tomas, M., &amp; Sutskever, I. (s.d.). Distribuited representations of words and phrases and their compositionality.</a:t>
             </a:r>
-            <a:endParaRPr lang="pt-BR" dirty="0"/>
           </a:p>
           <a:p>
             <a:pPr lvl="1" algn="l">
@@ -2587,7 +2500,6 @@
               <a:rPr lang="pt-BR" dirty="0"/>
               <a:t>Kryscinski, W., Keshar, N. S., McCAnn, B., Xiong, C., &amp; Socher, R. (2019). Neural text summarization: A critical evaluation.</a:t>
             </a:r>
-            <a:endParaRPr lang="pt-BR" dirty="0"/>
           </a:p>
           <a:p>
             <a:pPr lvl="1" algn="l">
@@ -2609,7 +2521,6 @@
               <a:rPr lang="pt-BR" dirty="0"/>
               <a:t>Luo, Q., Xu, W., &amp; Guo, J. (2014). A study on the CBOW model's overfitting and stability.</a:t>
             </a:r>
-            <a:endParaRPr lang="pt-BR" dirty="0"/>
           </a:p>
         </p:txBody>
       </p:sp>
@@ -2659,7 +2570,6 @@
               <a:rPr lang="pt-BR" sz="3200" dirty="0"/>
               <a:t>Escopo do Projeto</a:t>
             </a:r>
-            <a:endParaRPr lang="pt-BR" sz="3200" dirty="0"/>
           </a:p>
         </p:txBody>
       </p:sp>
@@ -2696,7 +2606,6 @@
               <a:rPr lang="pt-BR" dirty="0"/>
               <a:t> para coleta das notícias</a:t>
             </a:r>
-            <a:endParaRPr lang="pt-BR" dirty="0"/>
           </a:p>
           <a:p>
             <a:pPr lvl="1">
@@ -2705,9 +2614,8 @@
             </a:pPr>
             <a:r>
               <a:rPr lang="pt-BR" dirty="0"/>
-              <a:t>Implementação de algoritmo capaz de realizar a sumarização</a:t>
-            </a:r>
-            <a:endParaRPr lang="pt-BR" dirty="0"/>
+              <a:t>Implementar algoritmo capaz de realizar a sumarização extrativa</a:t>
+            </a:r>
           </a:p>
           <a:p>
             <a:pPr lvl="1">
@@ -2726,7 +2634,6 @@
               <a:rPr lang="pt-BR" dirty="0"/>
               <a:t> com um número maior de notícias para poder obter um melhor resultado</a:t>
             </a:r>
-            <a:endParaRPr lang="pt-BR" dirty="0"/>
           </a:p>
         </p:txBody>
       </p:sp>
@@ -2776,7 +2683,6 @@
               <a:rPr lang="pt-BR" sz="3200" dirty="0"/>
               <a:t>Recursos utilizados</a:t>
             </a:r>
-            <a:endParaRPr lang="pt-BR" sz="3200" dirty="0"/>
           </a:p>
         </p:txBody>
       </p:sp>
@@ -2815,7 +2721,11 @@
             </a:pPr>
             <a:r>
               <a:rPr lang="pt-BR" dirty="0"/>
-              <a:t>Visual Studio Code versão 1.45.1</a:t>
+              <a:t>Google </a:t>
+            </a:r>
+            <a:r>
+              <a:rPr lang="pt-BR" dirty="0" err="1"/>
+              <a:t>Colaboratory</a:t>
             </a:r>
             <a:endParaRPr lang="pt-BR" dirty="0"/>
           </a:p>
@@ -2828,7 +2738,6 @@
               <a:rPr lang="pt-BR" dirty="0"/>
               <a:t>Anaconda versão 1.9.12</a:t>
             </a:r>
-            <a:endParaRPr lang="pt-BR" dirty="0"/>
           </a:p>
           <a:p>
             <a:pPr lvl="1">
@@ -2839,7 +2748,6 @@
               <a:rPr lang="pt-BR" dirty="0"/>
               <a:t>Python versão 3.7</a:t>
             </a:r>
-            <a:endParaRPr lang="pt-BR" dirty="0"/>
           </a:p>
           <a:p>
             <a:pPr lvl="2">
@@ -2908,9 +2816,8 @@
           <a:p>
             <a:r>
               <a:rPr lang="pt-BR" sz="3200" dirty="0"/>
-              <a:t>Demonstração do Protótipo </a:t>
-            </a:r>
-            <a:endParaRPr lang="pt-BR" sz="3200" dirty="0"/>
+              <a:t>Protótipo </a:t>
+            </a:r>
           </a:p>
         </p:txBody>
       </p:sp>
@@ -2943,11 +2850,26 @@
             <a:endParaRPr lang="pt-BR" dirty="0"/>
           </a:p>
           <a:p>
-            <a:pPr marL="457200" lvl="1" indent="0">
+            <a:pPr lvl="1">
               <a:buFont typeface="Arial" panose="020B0604020202020204" pitchFamily="34" charset="0"/>
-              <a:buNone/>
+              <a:buChar char="•"/>
             </a:pPr>
+            <a:r>
+              <a:rPr lang="pt-BR" sz="2400" dirty="0" err="1"/>
+              <a:t>Webscrapping</a:t>
+            </a:r>
             <a:endParaRPr lang="pt-BR" sz="2400" dirty="0"/>
+          </a:p>
+          <a:p>
+            <a:pPr lvl="1">
+              <a:buFont typeface="Arial" panose="020B0604020202020204" pitchFamily="34" charset="0"/>
+              <a:buChar char="•"/>
+            </a:pPr>
+            <a:r>
+              <a:rPr lang="pt-BR" sz="2400" dirty="0"/>
+              <a:t>Sumarização Extrativa</a:t>
+            </a:r>
+            <a:endParaRPr lang="pt-BR" sz="2000" dirty="0"/>
           </a:p>
           <a:p>
             <a:pPr lvl="1">
@@ -3007,7 +2929,6 @@
               <a:rPr lang="pt-BR" sz="3200" dirty="0"/>
               <a:t>Metas para o TCC2</a:t>
             </a:r>
-            <a:endParaRPr lang="pt-BR" sz="3200" dirty="0"/>
           </a:p>
         </p:txBody>
       </p:sp>
@@ -3032,9 +2953,8 @@
             </a:pPr>
             <a:r>
               <a:rPr lang="pt-BR" dirty="0"/>
-              <a:t>Analisar os dados do TCC1</a:t>
-            </a:r>
-            <a:endParaRPr lang="pt-BR" dirty="0"/>
+              <a:t>Desenvolver uma rede neural capaz de realizar a sumarização</a:t>
+            </a:r>
           </a:p>
           <a:p>
             <a:pPr lvl="1">
@@ -3043,18 +2963,7 @@
             </a:pPr>
             <a:r>
               <a:rPr lang="pt-BR" dirty="0"/>
-              <a:t>Com base nos dados levantados no TCC1, evoluir o protótipo</a:t>
-            </a:r>
-            <a:endParaRPr lang="pt-BR" dirty="0"/>
-          </a:p>
-          <a:p>
-            <a:pPr lvl="1">
-              <a:buFont typeface="Arial" panose="020B0604020202020204" pitchFamily="34" charset="0"/>
-              <a:buChar char="•"/>
-            </a:pPr>
-            <a:r>
-              <a:rPr lang="pt-BR" dirty="0"/>
-              <a:t>Aumentar o </a:t>
+              <a:t>Trabalhar com </a:t>
             </a:r>
             <a:r>
               <a:rPr lang="pt-BR" i="1" dirty="0" err="1"/>
@@ -3062,20 +2971,8 @@
             </a:r>
             <a:r>
               <a:rPr lang="pt-BR" dirty="0"/>
-              <a:t> de notícias a ser analisada</a:t>
-            </a:r>
-            <a:endParaRPr lang="pt-BR" dirty="0"/>
-          </a:p>
-          <a:p>
-            <a:pPr lvl="1">
-              <a:buFont typeface="Arial" panose="020B0604020202020204" pitchFamily="34" charset="0"/>
-              <a:buChar char="•"/>
-            </a:pPr>
-            <a:r>
-              <a:rPr lang="pt-BR" dirty="0"/>
-              <a:t>Finalizar a monografia e apresentação para banca.</a:t>
-            </a:r>
-            <a:endParaRPr lang="pt-BR" dirty="0"/>
+              <a:t> com mais notícias e verificar se é possível diminuir o erro</a:t>
+            </a:r>
           </a:p>
           <a:p>
             <a:endParaRPr lang="pt-BR" dirty="0"/>
@@ -3406,6 +3303,7 @@
       </a:style>
     </a:lnDef>
   </a:objectDefaults>
+  <a:extraClrSchemeLst/>
   <a:extLst>
     <a:ext uri="{05A4C25C-085E-4340-85A3-A5531E510DB2}">
       <thm15:themeFamily xmlns:thm15="http://schemas.microsoft.com/office/thememl/2012/main" name="Office Theme" id="{62F939B6-93AF-4DB8-9C6B-D6C7DFDC589F}" vid="{4A3C46E8-61CC-4603-A589-7422A47A8E4A}"/>
@@ -3665,6 +3563,8 @@
       </a:bgFillStyleLst>
     </a:fmtScheme>
   </a:themeElements>
+  <a:objectDefaults/>
+  <a:extraClrSchemeLst/>
   <a:extLst>
     <a:ext uri="{05A4C25C-085E-4340-85A3-A5531E510DB2}">
       <thm15:themeFamily xmlns:thm15="http://schemas.microsoft.com/office/thememl/2012/main" name="Office Theme" id="{62F939B6-93AF-4DB8-9C6B-D6C7DFDC589F}" vid="{4A3C46E8-61CC-4603-A589-7422A47A8E4A}"/>
@@ -3924,6 +3824,8 @@
       </a:bgFillStyleLst>
     </a:fmtScheme>
   </a:themeElements>
+  <a:objectDefaults/>
+  <a:extraClrSchemeLst/>
   <a:extLst>
     <a:ext uri="{05A4C25C-085E-4340-85A3-A5531E510DB2}">
       <thm15:themeFamily xmlns:thm15="http://schemas.microsoft.com/office/thememl/2012/main" name="Office Theme" id="{62F939B6-93AF-4DB8-9C6B-D6C7DFDC589F}" vid="{4A3C46E8-61CC-4603-A589-7422A47A8E4A}"/>

</xml_diff>

<commit_message>
Alteração quantidade de amostras
</commit_message>
<xml_diff>
--- a/Documentos/ModeloApresentaçãoFacens_Sugestão.pptx
+++ b/Documentos/ModeloApresentaçãoFacens_Sugestão.pptx
@@ -2633,6 +2633,16 @@
             <a:r>
               <a:rPr lang="pt-BR" dirty="0"/>
               <a:t> com um número maior de notícias para poder obter um melhor resultado</a:t>
+            </a:r>
+          </a:p>
+          <a:p>
+            <a:pPr lvl="1">
+              <a:buFont typeface="Arial" panose="020B0604020202020204" pitchFamily="34" charset="0"/>
+              <a:buChar char="•"/>
+            </a:pPr>
+            <a:r>
+              <a:rPr lang="pt-BR" dirty="0"/>
+              <a:t>Sumarização de 287 notícias</a:t>
             </a:r>
           </a:p>
         </p:txBody>

</xml_diff>

<commit_message>
Adicionado github nos recursos
</commit_message>
<xml_diff>
--- a/Documentos/ModeloApresentaçãoFacens_Sugestão.pptx
+++ b/Documentos/ModeloApresentaçãoFacens_Sugestão.pptx
@@ -2624,24 +2624,6 @@
             </a:pPr>
             <a:r>
               <a:rPr lang="pt-BR" dirty="0"/>
-              <a:t>Coletar </a:t>
-            </a:r>
-            <a:r>
-              <a:rPr lang="pt-BR" i="1" dirty="0" err="1"/>
-              <a:t>dataset</a:t>
-            </a:r>
-            <a:r>
-              <a:rPr lang="pt-BR" dirty="0"/>
-              <a:t> com um número maior de notícias para poder obter um melhor resultado</a:t>
-            </a:r>
-          </a:p>
-          <a:p>
-            <a:pPr lvl="1">
-              <a:buFont typeface="Arial" panose="020B0604020202020204" pitchFamily="34" charset="0"/>
-              <a:buChar char="•"/>
-            </a:pPr>
-            <a:r>
-              <a:rPr lang="pt-BR" dirty="0"/>
               <a:t>Sumarização de 287 notícias</a:t>
             </a:r>
           </a:p>
@@ -2766,9 +2748,24 @@
             </a:pPr>
             <a:r>
               <a:rPr lang="pt-BR" dirty="0"/>
-              <a:t>Bibliotecas BeautifulSoup4, Pandas, Numpy, Tensorflow</a:t>
-            </a:r>
-            <a:endParaRPr lang="pt-BR" sz="2400" dirty="0"/>
+              <a:t>Bibliotecas BeautifulSoup4, Pandas, Numpy, </a:t>
+            </a:r>
+            <a:r>
+              <a:rPr lang="pt-BR" dirty="0" err="1"/>
+              <a:t>Tensorflow</a:t>
+            </a:r>
+            <a:endParaRPr lang="pt-BR" dirty="0"/>
+          </a:p>
+          <a:p>
+            <a:pPr lvl="1">
+              <a:buFont typeface="Arial" panose="020B0604020202020204" pitchFamily="34" charset="0"/>
+              <a:buChar char="•"/>
+            </a:pPr>
+            <a:r>
+              <a:rPr lang="pt-BR" dirty="0" err="1"/>
+              <a:t>Github</a:t>
+            </a:r>
+            <a:endParaRPr lang="pt-BR" dirty="0"/>
           </a:p>
           <a:p>
             <a:pPr lvl="1">

</xml_diff>